<commit_message>
feat: add the context to section 4
</commit_message>
<xml_diff>
--- a/hw2/figures/Global_Variables.pptx
+++ b/hw2/figures/Global_Variables.pptx
@@ -243,7 +243,7 @@
           <a:p>
             <a:fld id="{7135EC44-C5A7-40BF-BD7F-980CC5279D14}" type="datetimeFigureOut">
               <a:rPr lang="ko-KR" altLang="en-US" smtClean="0"/>
-              <a:t>2022-09-01</a:t>
+              <a:t>2022-09-08</a:t>
             </a:fld>
             <a:endParaRPr lang="ko-KR" altLang="en-US"/>
           </a:p>
@@ -413,7 +413,7 @@
           <a:p>
             <a:fld id="{7135EC44-C5A7-40BF-BD7F-980CC5279D14}" type="datetimeFigureOut">
               <a:rPr lang="ko-KR" altLang="en-US" smtClean="0"/>
-              <a:t>2022-09-01</a:t>
+              <a:t>2022-09-08</a:t>
             </a:fld>
             <a:endParaRPr lang="ko-KR" altLang="en-US"/>
           </a:p>
@@ -593,7 +593,7 @@
           <a:p>
             <a:fld id="{7135EC44-C5A7-40BF-BD7F-980CC5279D14}" type="datetimeFigureOut">
               <a:rPr lang="ko-KR" altLang="en-US" smtClean="0"/>
-              <a:t>2022-09-01</a:t>
+              <a:t>2022-09-08</a:t>
             </a:fld>
             <a:endParaRPr lang="ko-KR" altLang="en-US"/>
           </a:p>
@@ -763,7 +763,7 @@
           <a:p>
             <a:fld id="{7135EC44-C5A7-40BF-BD7F-980CC5279D14}" type="datetimeFigureOut">
               <a:rPr lang="ko-KR" altLang="en-US" smtClean="0"/>
-              <a:t>2022-09-01</a:t>
+              <a:t>2022-09-08</a:t>
             </a:fld>
             <a:endParaRPr lang="ko-KR" altLang="en-US"/>
           </a:p>
@@ -1007,7 +1007,7 @@
           <a:p>
             <a:fld id="{7135EC44-C5A7-40BF-BD7F-980CC5279D14}" type="datetimeFigureOut">
               <a:rPr lang="ko-KR" altLang="en-US" smtClean="0"/>
-              <a:t>2022-09-01</a:t>
+              <a:t>2022-09-08</a:t>
             </a:fld>
             <a:endParaRPr lang="ko-KR" altLang="en-US"/>
           </a:p>
@@ -1239,7 +1239,7 @@
           <a:p>
             <a:fld id="{7135EC44-C5A7-40BF-BD7F-980CC5279D14}" type="datetimeFigureOut">
               <a:rPr lang="ko-KR" altLang="en-US" smtClean="0"/>
-              <a:t>2022-09-01</a:t>
+              <a:t>2022-09-08</a:t>
             </a:fld>
             <a:endParaRPr lang="ko-KR" altLang="en-US"/>
           </a:p>
@@ -1606,7 +1606,7 @@
           <a:p>
             <a:fld id="{7135EC44-C5A7-40BF-BD7F-980CC5279D14}" type="datetimeFigureOut">
               <a:rPr lang="ko-KR" altLang="en-US" smtClean="0"/>
-              <a:t>2022-09-01</a:t>
+              <a:t>2022-09-08</a:t>
             </a:fld>
             <a:endParaRPr lang="ko-KR" altLang="en-US"/>
           </a:p>
@@ -1724,7 +1724,7 @@
           <a:p>
             <a:fld id="{7135EC44-C5A7-40BF-BD7F-980CC5279D14}" type="datetimeFigureOut">
               <a:rPr lang="ko-KR" altLang="en-US" smtClean="0"/>
-              <a:t>2022-09-01</a:t>
+              <a:t>2022-09-08</a:t>
             </a:fld>
             <a:endParaRPr lang="ko-KR" altLang="en-US"/>
           </a:p>
@@ -1819,7 +1819,7 @@
           <a:p>
             <a:fld id="{7135EC44-C5A7-40BF-BD7F-980CC5279D14}" type="datetimeFigureOut">
               <a:rPr lang="ko-KR" altLang="en-US" smtClean="0"/>
-              <a:t>2022-09-01</a:t>
+              <a:t>2022-09-08</a:t>
             </a:fld>
             <a:endParaRPr lang="ko-KR" altLang="en-US"/>
           </a:p>
@@ -2096,7 +2096,7 @@
           <a:p>
             <a:fld id="{7135EC44-C5A7-40BF-BD7F-980CC5279D14}" type="datetimeFigureOut">
               <a:rPr lang="ko-KR" altLang="en-US" smtClean="0"/>
-              <a:t>2022-09-01</a:t>
+              <a:t>2022-09-08</a:t>
             </a:fld>
             <a:endParaRPr lang="ko-KR" altLang="en-US"/>
           </a:p>
@@ -2353,7 +2353,7 @@
           <a:p>
             <a:fld id="{7135EC44-C5A7-40BF-BD7F-980CC5279D14}" type="datetimeFigureOut">
               <a:rPr lang="ko-KR" altLang="en-US" smtClean="0"/>
-              <a:t>2022-09-01</a:t>
+              <a:t>2022-09-08</a:t>
             </a:fld>
             <a:endParaRPr lang="ko-KR" altLang="en-US"/>
           </a:p>
@@ -2566,7 +2566,7 @@
           <a:p>
             <a:fld id="{7135EC44-C5A7-40BF-BD7F-980CC5279D14}" type="datetimeFigureOut">
               <a:rPr lang="ko-KR" altLang="en-US" smtClean="0"/>
-              <a:t>2022-09-01</a:t>
+              <a:t>2022-09-08</a:t>
             </a:fld>
             <a:endParaRPr lang="ko-KR" altLang="en-US"/>
           </a:p>
@@ -2986,14 +2986,14 @@
           <p:nvPr>
             <p:extLst>
               <p:ext uri="{D42A27DB-BD31-4B8C-83A1-F6EECF244321}">
-                <p14:modId xmlns:p14="http://schemas.microsoft.com/office/powerpoint/2010/main" val="2652486859"/>
+                <p14:modId xmlns:p14="http://schemas.microsoft.com/office/powerpoint/2010/main" val="3320518628"/>
               </p:ext>
             </p:extLst>
           </p:nvPr>
         </p:nvGraphicFramePr>
         <p:xfrm>
-          <a:off x="0" y="3472657"/>
-          <a:ext cx="5715000" cy="834392"/>
+          <a:off x="0" y="2245837"/>
+          <a:ext cx="5355220" cy="834392"/>
         </p:xfrm>
         <a:graphic>
           <a:graphicData uri="http://schemas.openxmlformats.org/drawingml/2006/table">
@@ -3002,14 +3002,14 @@
                 <a:tableStyleId>{073A0DAA-6AF3-43AB-8588-CEC1D06C72B9}</a:tableStyleId>
               </a:tblPr>
               <a:tblGrid>
-                <a:gridCol w="934902">
+                <a:gridCol w="1026795">
                   <a:extLst>
                     <a:ext uri="{9D8B030D-6E8A-4147-A177-3AD203B41FA5}">
                       <a16:colId xmlns:a16="http://schemas.microsoft.com/office/drawing/2014/main" val="982842542"/>
                     </a:ext>
                   </a:extLst>
                 </a:gridCol>
-                <a:gridCol w="1002218">
+                <a:gridCol w="550545">
                   <a:extLst>
                     <a:ext uri="{9D8B030D-6E8A-4147-A177-3AD203B41FA5}">
                       <a16:colId xmlns:a16="http://schemas.microsoft.com/office/drawing/2014/main" val="1596198626"/>
@@ -3067,7 +3067,7 @@
                     <a:p>
                       <a:pPr algn="ctr" latinLnBrk="1"/>
                       <a:r>
-                        <a:rPr lang="en-US" altLang="ko-KR" sz="800">
+                        <a:rPr lang="en-US" altLang="ko-KR" sz="800" dirty="0">
                           <a:latin typeface="+mn-lt"/>
                         </a:rPr>
                         <a:t>Definition</a:t>
@@ -3093,10 +3093,10 @@
                     <a:p>
                       <a:pPr algn="ctr" latinLnBrk="1"/>
                       <a:r>
-                        <a:rPr lang="en-US" altLang="ko-KR" sz="800">
+                        <a:rPr lang="en-US" altLang="ko-KR" sz="800" dirty="0">
                           <a:latin typeface="+mn-lt"/>
                         </a:rPr>
-                        <a:t>QUIT</a:t>
+                        <a:t>ASCII_SIZE</a:t>
                       </a:r>
                       <a:endParaRPr lang="ko-KR" altLang="en-US" sz="800" dirty="0">
                         <a:latin typeface="+mn-lt"/>
@@ -3115,7 +3115,7 @@
                         <a:rPr lang="en-US" altLang="ko-KR" sz="800" dirty="0">
                           <a:latin typeface="+mn-lt"/>
                         </a:rPr>
-                        <a:t>Integer</a:t>
+                        <a:t>256</a:t>
                       </a:r>
                       <a:endParaRPr lang="ko-KR" altLang="en-US" sz="800" dirty="0">
                         <a:latin typeface="+mn-lt"/>
@@ -3136,7 +3136,7 @@
                         <a:rPr lang="en-US" altLang="ko-KR" sz="800" dirty="0">
                           <a:latin typeface="+mn-lt"/>
                         </a:rPr>
-                        <a:t>Variable that is used to check the terminate condition</a:t>
+                        <a:t>Size of the total number of ASCII characters</a:t>
                       </a:r>
                       <a:endParaRPr lang="ko-KR" altLang="en-US" sz="800" dirty="0">
                         <a:latin typeface="+mn-lt"/>
@@ -3159,10 +3159,10 @@
                     <a:p>
                       <a:pPr algn="ctr" latinLnBrk="1"/>
                       <a:r>
-                        <a:rPr lang="en-US" altLang="ko-KR" sz="800">
+                        <a:rPr lang="en-US" altLang="ko-KR" sz="800" dirty="0">
                           <a:latin typeface="+mn-lt"/>
                         </a:rPr>
-                        <a:t>SHELL_NAME</a:t>
+                        <a:t>BUFFER_SIZE</a:t>
                       </a:r>
                       <a:endParaRPr lang="ko-KR" altLang="en-US" sz="800" dirty="0">
                         <a:latin typeface="+mn-lt"/>
@@ -3181,7 +3181,7 @@
                         <a:rPr lang="en-US" altLang="ko-KR" sz="800" dirty="0">
                           <a:latin typeface="+mn-lt"/>
                         </a:rPr>
-                        <a:t>String</a:t>
+                        <a:t>100</a:t>
                       </a:r>
                       <a:endParaRPr lang="ko-KR" altLang="en-US" sz="800" dirty="0">
                         <a:latin typeface="+mn-lt"/>
@@ -3202,7 +3202,7 @@
                         <a:rPr lang="en-US" altLang="ko-KR" sz="800" dirty="0">
                           <a:latin typeface="+mn-lt"/>
                         </a:rPr>
-                        <a:t>Specifies the name of the shell</a:t>
+                        <a:t>The size of the shared buffer</a:t>
                       </a:r>
                       <a:endParaRPr lang="ko-KR" altLang="en-US" sz="800" dirty="0">
                         <a:latin typeface="+mn-lt"/>
@@ -3225,10 +3225,10 @@
                     <a:p>
                       <a:pPr algn="ctr" latinLnBrk="1"/>
                       <a:r>
-                        <a:rPr lang="en-US" altLang="ko-KR" sz="800" dirty="0" err="1">
+                        <a:rPr lang="en-US" altLang="ko-KR" sz="800" dirty="0">
                           <a:latin typeface="+mn-lt"/>
                         </a:rPr>
-                        <a:t>builtin_cmd</a:t>
+                        <a:t>MAX_STRING-LENFTG</a:t>
                       </a:r>
                       <a:endParaRPr lang="ko-KR" altLang="en-US" sz="800" dirty="0">
                         <a:latin typeface="+mn-lt"/>
@@ -3247,7 +3247,7 @@
                         <a:rPr lang="en-US" altLang="ko-KR" sz="800" dirty="0">
                           <a:latin typeface="+mn-lt"/>
                         </a:rPr>
-                        <a:t>Array of String</a:t>
+                        <a:t>30</a:t>
                       </a:r>
                       <a:endParaRPr lang="ko-KR" altLang="en-US" sz="800" dirty="0">
                         <a:latin typeface="+mn-lt"/>
@@ -3268,7 +3268,7 @@
                         <a:rPr lang="en-US" altLang="ko-KR" sz="800" dirty="0">
                           <a:latin typeface="+mn-lt"/>
                         </a:rPr>
-                        <a:t>Array that stores the built-in commands that needs additional parameters to execute.</a:t>
+                        <a:t>Maximum length of the single word that the word count program will read</a:t>
                       </a:r>
                       <a:endParaRPr lang="ko-KR" altLang="en-US" sz="800" dirty="0">
                         <a:latin typeface="+mn-lt"/>

</xml_diff>